<commit_message>
update figures and texts
</commit_message>
<xml_diff>
--- a/figs/flow.pptx
+++ b/figs/flow.pptx
@@ -4,6 +4,9 @@
   <p:sldMasterIdLst>
     <p:sldMasterId id="2147483648" r:id="rId1"/>
   </p:sldMasterIdLst>
+  <p:notesMasterIdLst>
+    <p:notesMasterId r:id="rId7"/>
+  </p:notesMasterIdLst>
   <p:sldIdLst>
     <p:sldId id="256" r:id="rId2"/>
     <p:sldId id="258" r:id="rId3"/>
@@ -108,6 +111,11 @@
       </a:defRPr>
     </a:lvl9pPr>
   </p:defaultTextStyle>
+  <p:extLst>
+    <p:ext uri="{EFAFB233-063F-42B5-8137-9DF3F51BA10A}">
+      <p15:sldGuideLst xmlns:p15="http://schemas.microsoft.com/office/powerpoint/2012/main"/>
+    </p:ext>
+  </p:extLst>
 </p:presentation>
 </file>
 
@@ -5402,7 +5410,7 @@
   <dgm:whole/>
   <dgm:extLst>
     <a:ext uri="http://schemas.microsoft.com/office/drawing/2008/diagram">
-      <dsp:dataModelExt xmlns:dsp="http://schemas.microsoft.com/office/drawing/2008/diagram" relId="rId6" minVer="http://schemas.openxmlformats.org/drawingml/2006/diagram"/>
+      <dsp:dataModelExt xmlns:dsp="http://schemas.microsoft.com/office/drawing/2008/diagram" relId="rId7" minVer="http://schemas.openxmlformats.org/drawingml/2006/diagram"/>
     </a:ext>
   </dgm:extLst>
 </dgm:dataModel>
@@ -6931,7 +6939,7 @@
         <a:lstStyle/>
         <a:p>
           <a:r>
-            <a:rPr lang="en-US" sz="2000" b="1" dirty="0">
+            <a:rPr lang="en-US" sz="2800" b="1" dirty="0">
               <a:latin typeface="Source Sans Pro" panose="020B0503030403020204" pitchFamily="34" charset="77"/>
             </a:rPr>
             <a:t>Spatial</a:t>
@@ -6946,7 +6954,7 @@
         <a:bodyPr/>
         <a:lstStyle/>
         <a:p>
-          <a:endParaRPr lang="en-US">
+          <a:endParaRPr lang="en-US" sz="2400">
             <a:latin typeface="Source Sans Pro" panose="020B0503030403020204" pitchFamily="34" charset="77"/>
           </a:endParaRPr>
         </a:p>
@@ -6959,7 +6967,7 @@
         <a:bodyPr/>
         <a:lstStyle/>
         <a:p>
-          <a:endParaRPr lang="en-US">
+          <a:endParaRPr lang="en-US" sz="2400">
             <a:latin typeface="Source Sans Pro" panose="020B0503030403020204" pitchFamily="34" charset="77"/>
           </a:endParaRPr>
         </a:p>
@@ -6973,7 +6981,7 @@
         <a:lstStyle/>
         <a:p>
           <a:r>
-            <a:rPr lang="en-US" sz="1600" dirty="0">
+            <a:rPr lang="en-US" sz="2000" dirty="0">
               <a:latin typeface="Source Sans Pro" panose="020B0503030403020204" pitchFamily="34" charset="77"/>
             </a:rPr>
             <a:t>Banking + Buffering</a:t>
@@ -6988,7 +6996,7 @@
         <a:bodyPr/>
         <a:lstStyle/>
         <a:p>
-          <a:endParaRPr lang="en-US">
+          <a:endParaRPr lang="en-US" sz="2400">
             <a:latin typeface="Source Sans Pro" panose="020B0503030403020204" pitchFamily="34" charset="77"/>
           </a:endParaRPr>
         </a:p>
@@ -7001,7 +7009,7 @@
         <a:bodyPr/>
         <a:lstStyle/>
         <a:p>
-          <a:endParaRPr lang="en-US">
+          <a:endParaRPr lang="en-US" sz="2400">
             <a:latin typeface="Source Sans Pro" panose="020B0503030403020204" pitchFamily="34" charset="77"/>
           </a:endParaRPr>
         </a:p>
@@ -7015,7 +7023,7 @@
         <a:lstStyle/>
         <a:p>
           <a:r>
-            <a:rPr lang="en-US" sz="1600" dirty="0">
+            <a:rPr lang="en-US" sz="2000" dirty="0">
               <a:latin typeface="Source Sans Pro" panose="020B0503030403020204" pitchFamily="34" charset="77"/>
             </a:rPr>
             <a:t>Loop Unrolling</a:t>
@@ -7030,7 +7038,7 @@
         <a:bodyPr/>
         <a:lstStyle/>
         <a:p>
-          <a:endParaRPr lang="en-US">
+          <a:endParaRPr lang="en-US" sz="2400">
             <a:latin typeface="Source Sans Pro" panose="020B0503030403020204" pitchFamily="34" charset="77"/>
           </a:endParaRPr>
         </a:p>
@@ -7043,7 +7051,7 @@
         <a:bodyPr/>
         <a:lstStyle/>
         <a:p>
-          <a:endParaRPr lang="en-US">
+          <a:endParaRPr lang="en-US" sz="2400">
             <a:latin typeface="Source Sans Pro" panose="020B0503030403020204" pitchFamily="34" charset="77"/>
           </a:endParaRPr>
         </a:p>
@@ -7057,7 +7065,7 @@
         <a:lstStyle/>
         <a:p>
           <a:r>
-            <a:rPr lang="en-US" sz="2000" b="1" dirty="0">
+            <a:rPr lang="en-US" sz="2800" b="1" dirty="0">
               <a:latin typeface="Source Sans Pro" panose="020B0503030403020204" pitchFamily="34" charset="77"/>
             </a:rPr>
             <a:t>Plasticine IR</a:t>
@@ -7072,7 +7080,7 @@
         <a:bodyPr/>
         <a:lstStyle/>
         <a:p>
-          <a:endParaRPr lang="en-US">
+          <a:endParaRPr lang="en-US" sz="2400">
             <a:latin typeface="Source Sans Pro" panose="020B0503030403020204" pitchFamily="34" charset="77"/>
           </a:endParaRPr>
         </a:p>
@@ -7085,7 +7093,7 @@
         <a:bodyPr/>
         <a:lstStyle/>
         <a:p>
-          <a:endParaRPr lang="en-US">
+          <a:endParaRPr lang="en-US" sz="2400">
             <a:latin typeface="Source Sans Pro" panose="020B0503030403020204" pitchFamily="34" charset="77"/>
           </a:endParaRPr>
         </a:p>
@@ -7099,7 +7107,7 @@
         <a:lstStyle/>
         <a:p>
           <a:r>
-            <a:rPr lang="en-US" sz="1600" dirty="0">
+            <a:rPr lang="en-US" sz="2000" dirty="0">
               <a:latin typeface="Source Sans Pro" panose="020B0503030403020204" pitchFamily="34" charset="77"/>
             </a:rPr>
             <a:t>Compute Unit Allocation and Partitioning</a:t>
@@ -7114,7 +7122,7 @@
         <a:bodyPr/>
         <a:lstStyle/>
         <a:p>
-          <a:endParaRPr lang="en-US">
+          <a:endParaRPr lang="en-US" sz="2400">
             <a:latin typeface="Source Sans Pro" panose="020B0503030403020204" pitchFamily="34" charset="77"/>
           </a:endParaRPr>
         </a:p>
@@ -7127,7 +7135,7 @@
         <a:bodyPr/>
         <a:lstStyle/>
         <a:p>
-          <a:endParaRPr lang="en-US">
+          <a:endParaRPr lang="en-US" sz="2400">
             <a:latin typeface="Source Sans Pro" panose="020B0503030403020204" pitchFamily="34" charset="77"/>
           </a:endParaRPr>
         </a:p>
@@ -7141,7 +7149,7 @@
         <a:lstStyle/>
         <a:p>
           <a:r>
-            <a:rPr lang="en-US" sz="1600" dirty="0">
+            <a:rPr lang="en-US" sz="2000" dirty="0">
               <a:latin typeface="Source Sans Pro" panose="020B0503030403020204" pitchFamily="34" charset="77"/>
             </a:rPr>
             <a:t>Control Logic Allocation</a:t>
@@ -7156,7 +7164,7 @@
         <a:bodyPr/>
         <a:lstStyle/>
         <a:p>
-          <a:endParaRPr lang="en-US">
+          <a:endParaRPr lang="en-US" sz="2400">
             <a:latin typeface="Source Sans Pro" panose="020B0503030403020204" pitchFamily="34" charset="77"/>
           </a:endParaRPr>
         </a:p>
@@ -7169,7 +7177,7 @@
         <a:bodyPr/>
         <a:lstStyle/>
         <a:p>
-          <a:endParaRPr lang="en-US">
+          <a:endParaRPr lang="en-US" sz="2400">
             <a:latin typeface="Source Sans Pro" panose="020B0503030403020204" pitchFamily="34" charset="77"/>
           </a:endParaRPr>
         </a:p>
@@ -7183,7 +7191,7 @@
         <a:lstStyle/>
         <a:p>
           <a:r>
-            <a:rPr lang="en-US" sz="2000" b="1" dirty="0">
+            <a:rPr lang="en-US" sz="2800" b="1" dirty="0">
               <a:latin typeface="Source Sans Pro" panose="020B0503030403020204" pitchFamily="34" charset="77"/>
             </a:rPr>
             <a:t>Mapping</a:t>
@@ -7198,7 +7206,7 @@
         <a:bodyPr/>
         <a:lstStyle/>
         <a:p>
-          <a:endParaRPr lang="en-US">
+          <a:endParaRPr lang="en-US" sz="2400">
             <a:latin typeface="Source Sans Pro" panose="020B0503030403020204" pitchFamily="34" charset="77"/>
           </a:endParaRPr>
         </a:p>
@@ -7211,7 +7219,7 @@
         <a:bodyPr/>
         <a:lstStyle/>
         <a:p>
-          <a:endParaRPr lang="en-US">
+          <a:endParaRPr lang="en-US" sz="2400">
             <a:latin typeface="Source Sans Pro" panose="020B0503030403020204" pitchFamily="34" charset="77"/>
           </a:endParaRPr>
         </a:p>
@@ -7225,7 +7233,7 @@
         <a:lstStyle/>
         <a:p>
           <a:r>
-            <a:rPr lang="en-US" sz="1600" dirty="0">
+            <a:rPr lang="en-US" sz="2000" dirty="0">
               <a:latin typeface="Source Sans Pro" panose="020B0503030403020204" pitchFamily="34" charset="77"/>
             </a:rPr>
             <a:t>Placement and Routing</a:t>
@@ -7240,7 +7248,7 @@
         <a:bodyPr/>
         <a:lstStyle/>
         <a:p>
-          <a:endParaRPr lang="en-US">
+          <a:endParaRPr lang="en-US" sz="2400">
             <a:latin typeface="Source Sans Pro" panose="020B0503030403020204" pitchFamily="34" charset="77"/>
           </a:endParaRPr>
         </a:p>
@@ -7253,7 +7261,7 @@
         <a:bodyPr/>
         <a:lstStyle/>
         <a:p>
-          <a:endParaRPr lang="en-US">
+          <a:endParaRPr lang="en-US" sz="2400">
             <a:latin typeface="Source Sans Pro" panose="020B0503030403020204" pitchFamily="34" charset="77"/>
           </a:endParaRPr>
         </a:p>
@@ -7267,7 +7275,7 @@
         <a:lstStyle/>
         <a:p>
           <a:r>
-            <a:rPr lang="en-US" sz="1600" dirty="0">
+            <a:rPr lang="en-US" sz="2000" dirty="0">
               <a:latin typeface="Source Sans Pro" panose="020B0503030403020204" pitchFamily="34" charset="77"/>
             </a:rPr>
             <a:t>VC Allocation</a:t>
@@ -7282,7 +7290,7 @@
         <a:bodyPr/>
         <a:lstStyle/>
         <a:p>
-          <a:endParaRPr lang="en-US">
+          <a:endParaRPr lang="en-US" sz="2400">
             <a:latin typeface="Source Sans Pro" panose="020B0503030403020204" pitchFamily="34" charset="77"/>
           </a:endParaRPr>
         </a:p>
@@ -7295,7 +7303,7 @@
         <a:bodyPr/>
         <a:lstStyle/>
         <a:p>
-          <a:endParaRPr lang="en-US">
+          <a:endParaRPr lang="en-US" sz="2400">
             <a:latin typeface="Source Sans Pro" panose="020B0503030403020204" pitchFamily="34" charset="77"/>
           </a:endParaRPr>
         </a:p>
@@ -7309,7 +7317,7 @@
         <a:lstStyle/>
         <a:p>
           <a:r>
-            <a:rPr lang="en-US" sz="2000" b="1" dirty="0">
+            <a:rPr lang="en-US" sz="2800" b="1" dirty="0">
               <a:latin typeface="Source Sans Pro" panose="020B0503030403020204" pitchFamily="34" charset="77"/>
             </a:rPr>
             <a:t>Simulation</a:t>
@@ -7324,7 +7332,7 @@
         <a:bodyPr/>
         <a:lstStyle/>
         <a:p>
-          <a:endParaRPr lang="en-US">
+          <a:endParaRPr lang="en-US" sz="2400">
             <a:latin typeface="Source Sans Pro" panose="020B0503030403020204" pitchFamily="34" charset="77"/>
           </a:endParaRPr>
         </a:p>
@@ -7337,7 +7345,7 @@
         <a:bodyPr/>
         <a:lstStyle/>
         <a:p>
-          <a:endParaRPr lang="en-US">
+          <a:endParaRPr lang="en-US" sz="2400">
             <a:latin typeface="Source Sans Pro" panose="020B0503030403020204" pitchFamily="34" charset="77"/>
           </a:endParaRPr>
         </a:p>
@@ -7351,7 +7359,7 @@
         <a:lstStyle/>
         <a:p>
           <a:r>
-            <a:rPr lang="en-US" sz="1600" dirty="0">
+            <a:rPr lang="en-US" sz="2000" dirty="0">
               <a:latin typeface="Source Sans Pro" panose="020B0503030403020204" pitchFamily="34" charset="77"/>
             </a:rPr>
             <a:t>Fast Cycle Accurate Control Simulation</a:t>
@@ -7366,7 +7374,7 @@
         <a:bodyPr/>
         <a:lstStyle/>
         <a:p>
-          <a:endParaRPr lang="en-US">
+          <a:endParaRPr lang="en-US" sz="2400">
             <a:latin typeface="Source Sans Pro" panose="020B0503030403020204" pitchFamily="34" charset="77"/>
           </a:endParaRPr>
         </a:p>
@@ -7379,7 +7387,7 @@
         <a:bodyPr/>
         <a:lstStyle/>
         <a:p>
-          <a:endParaRPr lang="en-US">
+          <a:endParaRPr lang="en-US" sz="2400">
             <a:latin typeface="Source Sans Pro" panose="020B0503030403020204" pitchFamily="34" charset="77"/>
           </a:endParaRPr>
         </a:p>
@@ -7393,30 +7401,30 @@
         <a:lstStyle/>
         <a:p>
           <a:r>
-            <a:rPr lang="en-US" sz="1600" dirty="0">
+            <a:rPr lang="en-US" sz="2000" dirty="0">
               <a:latin typeface="Source Sans Pro" panose="020B0503030403020204" pitchFamily="34" charset="77"/>
             </a:rPr>
             <a:t>Integrated with </a:t>
           </a:r>
           <a:r>
-            <a:rPr lang="en-US" sz="1600" dirty="0" err="1">
+            <a:rPr lang="en-US" sz="2000" dirty="0" err="1">
               <a:latin typeface="Source Sans Pro" panose="020B0503030403020204" pitchFamily="34" charset="77"/>
             </a:rPr>
             <a:t>DRAMSim</a:t>
           </a:r>
           <a:r>
-            <a:rPr lang="en-US" sz="1600" dirty="0">
+            <a:rPr lang="en-US" sz="2000" dirty="0">
               <a:latin typeface="Source Sans Pro" panose="020B0503030403020204" pitchFamily="34" charset="77"/>
             </a:rPr>
             <a:t> and </a:t>
           </a:r>
           <a:r>
-            <a:rPr lang="en-US" sz="1600" dirty="0" err="1">
+            <a:rPr lang="en-US" sz="2000" dirty="0" err="1">
               <a:latin typeface="Source Sans Pro" panose="020B0503030403020204" pitchFamily="34" charset="77"/>
             </a:rPr>
             <a:t>BookSim</a:t>
           </a:r>
-          <a:endParaRPr lang="en-US" sz="1600" dirty="0">
+          <a:endParaRPr lang="en-US" sz="2000" dirty="0">
             <a:latin typeface="Source Sans Pro" panose="020B0503030403020204" pitchFamily="34" charset="77"/>
           </a:endParaRPr>
         </a:p>
@@ -7429,7 +7437,7 @@
         <a:bodyPr/>
         <a:lstStyle/>
         <a:p>
-          <a:endParaRPr lang="en-US">
+          <a:endParaRPr lang="en-US" sz="2400">
             <a:latin typeface="Source Sans Pro" panose="020B0503030403020204" pitchFamily="34" charset="77"/>
           </a:endParaRPr>
         </a:p>
@@ -7442,7 +7450,7 @@
         <a:bodyPr/>
         <a:lstStyle/>
         <a:p>
-          <a:endParaRPr lang="en-US">
+          <a:endParaRPr lang="en-US" sz="2400">
             <a:latin typeface="Source Sans Pro" panose="020B0503030403020204" pitchFamily="34" charset="77"/>
           </a:endParaRPr>
         </a:p>
@@ -7458,7 +7466,7 @@
       <dgm:spPr/>
     </dgm:pt>
     <dgm:pt modelId="{7F321D06-88EA-964A-A449-06F05C2C6941}" type="pres">
-      <dgm:prSet presAssocID="{1FF27E07-8665-C945-9297-D904B93FFF1D}" presName="arrow" presStyleLbl="bgShp" presStyleIdx="0" presStyleCnt="1"/>
+      <dgm:prSet presAssocID="{1FF27E07-8665-C945-9297-D904B93FFF1D}" presName="arrow" presStyleLbl="bgShp" presStyleIdx="0" presStyleCnt="1" custScaleX="108427"/>
       <dgm:spPr/>
     </dgm:pt>
     <dgm:pt modelId="{8B281EE0-F8DC-B44E-8BFE-1BD5787D4A1D}" type="pres">
@@ -10861,8 +10869,8 @@
       </dsp:nvSpPr>
       <dsp:spPr>
         <a:xfrm>
-          <a:off x="875029" y="0"/>
-          <a:ext cx="9917006" cy="3903134"/>
+          <a:off x="457176" y="0"/>
+          <a:ext cx="10752712" cy="6866466"/>
         </a:xfrm>
         <a:prstGeom prst="rightArrow">
           <a:avLst/>
@@ -10901,8 +10909,8 @@
       </dsp:nvSpPr>
       <dsp:spPr>
         <a:xfrm>
-          <a:off x="4130" y="1170940"/>
-          <a:ext cx="2628009" cy="1561253"/>
+          <a:off x="3987" y="2059939"/>
+          <a:ext cx="2590908" cy="2746586"/>
         </a:xfrm>
         <a:prstGeom prst="roundRect">
           <a:avLst/>
@@ -10944,12 +10952,12 @@
         </a:fontRef>
       </dsp:style>
       <dsp:txBody>
-        <a:bodyPr spcFirstLastPara="0" vert="horz" wrap="square" lIns="76200" tIns="76200" rIns="76200" bIns="76200" numCol="1" spcCol="1270" anchor="t" anchorCtr="0">
+        <a:bodyPr spcFirstLastPara="0" vert="horz" wrap="square" lIns="106680" tIns="106680" rIns="106680" bIns="106680" numCol="1" spcCol="1270" anchor="t" anchorCtr="0">
           <a:noAutofit/>
         </a:bodyPr>
         <a:lstStyle/>
         <a:p>
-          <a:pPr marL="0" lvl="0" indent="0" algn="l" defTabSz="889000">
+          <a:pPr marL="0" lvl="0" indent="0" algn="l" defTabSz="1244600">
             <a:lnSpc>
               <a:spcPct val="90000"/>
             </a:lnSpc>
@@ -10962,14 +10970,14 @@
             <a:buNone/>
           </a:pPr>
           <a:r>
-            <a:rPr lang="en-US" sz="2000" b="1" kern="1200" dirty="0">
+            <a:rPr lang="en-US" sz="2800" b="1" kern="1200" dirty="0">
               <a:latin typeface="Source Sans Pro" panose="020B0503030403020204" pitchFamily="34" charset="77"/>
             </a:rPr>
             <a:t>Spatial</a:t>
           </a:r>
         </a:p>
         <a:p>
-          <a:pPr marL="171450" lvl="1" indent="-171450" algn="l" defTabSz="711200">
+          <a:pPr marL="228600" lvl="1" indent="-228600" algn="l" defTabSz="889000">
             <a:lnSpc>
               <a:spcPct val="90000"/>
             </a:lnSpc>
@@ -10982,14 +10990,14 @@
             <a:buChar char="•"/>
           </a:pPr>
           <a:r>
-            <a:rPr lang="en-US" sz="1600" kern="1200" dirty="0">
+            <a:rPr lang="en-US" sz="2000" kern="1200" dirty="0">
               <a:latin typeface="Source Sans Pro" panose="020B0503030403020204" pitchFamily="34" charset="77"/>
             </a:rPr>
             <a:t>Banking + Buffering</a:t>
           </a:r>
         </a:p>
         <a:p>
-          <a:pPr marL="171450" lvl="1" indent="-171450" algn="l" defTabSz="711200">
+          <a:pPr marL="228600" lvl="1" indent="-228600" algn="l" defTabSz="889000">
             <a:lnSpc>
               <a:spcPct val="90000"/>
             </a:lnSpc>
@@ -11002,7 +11010,7 @@
             <a:buChar char="•"/>
           </a:pPr>
           <a:r>
-            <a:rPr lang="en-US" sz="1600" kern="1200" dirty="0">
+            <a:rPr lang="en-US" sz="2000" kern="1200" dirty="0">
               <a:latin typeface="Source Sans Pro" panose="020B0503030403020204" pitchFamily="34" charset="77"/>
             </a:rPr>
             <a:t>Loop Unrolling</a:t>
@@ -11010,8 +11018,8 @@
         </a:p>
       </dsp:txBody>
       <dsp:txXfrm>
-        <a:off x="80344" y="1247154"/>
-        <a:ext cx="2475581" cy="1408825"/>
+        <a:off x="130465" y="2186417"/>
+        <a:ext cx="2337952" cy="2493630"/>
       </dsp:txXfrm>
     </dsp:sp>
     <dsp:sp modelId="{0D297AB3-DCFC-914C-9557-A9A6C7F0C4D4}">
@@ -11021,8 +11029,8 @@
       </dsp:nvSpPr>
       <dsp:spPr>
         <a:xfrm>
-          <a:off x="3014395" y="1170940"/>
-          <a:ext cx="2628009" cy="1561253"/>
+          <a:off x="3026714" y="2059939"/>
+          <a:ext cx="2590908" cy="2746586"/>
         </a:xfrm>
         <a:prstGeom prst="roundRect">
           <a:avLst/>
@@ -11064,12 +11072,12 @@
         </a:fontRef>
       </dsp:style>
       <dsp:txBody>
-        <a:bodyPr spcFirstLastPara="0" vert="horz" wrap="square" lIns="76200" tIns="76200" rIns="76200" bIns="76200" numCol="1" spcCol="1270" anchor="t" anchorCtr="0">
+        <a:bodyPr spcFirstLastPara="0" vert="horz" wrap="square" lIns="106680" tIns="106680" rIns="106680" bIns="106680" numCol="1" spcCol="1270" anchor="t" anchorCtr="0">
           <a:noAutofit/>
         </a:bodyPr>
         <a:lstStyle/>
         <a:p>
-          <a:pPr marL="0" lvl="0" indent="0" algn="l" defTabSz="889000">
+          <a:pPr marL="0" lvl="0" indent="0" algn="l" defTabSz="1244600">
             <a:lnSpc>
               <a:spcPct val="90000"/>
             </a:lnSpc>
@@ -11082,14 +11090,14 @@
             <a:buNone/>
           </a:pPr>
           <a:r>
-            <a:rPr lang="en-US" sz="2000" b="1" kern="1200" dirty="0">
+            <a:rPr lang="en-US" sz="2800" b="1" kern="1200" dirty="0">
               <a:latin typeface="Source Sans Pro" panose="020B0503030403020204" pitchFamily="34" charset="77"/>
             </a:rPr>
             <a:t>Plasticine IR</a:t>
           </a:r>
         </a:p>
         <a:p>
-          <a:pPr marL="171450" lvl="1" indent="-171450" algn="l" defTabSz="711200">
+          <a:pPr marL="228600" lvl="1" indent="-228600" algn="l" defTabSz="889000">
             <a:lnSpc>
               <a:spcPct val="90000"/>
             </a:lnSpc>
@@ -11102,14 +11110,14 @@
             <a:buChar char="•"/>
           </a:pPr>
           <a:r>
-            <a:rPr lang="en-US" sz="1600" kern="1200" dirty="0">
+            <a:rPr lang="en-US" sz="2000" kern="1200" dirty="0">
               <a:latin typeface="Source Sans Pro" panose="020B0503030403020204" pitchFamily="34" charset="77"/>
             </a:rPr>
             <a:t>Compute Unit Allocation and Partitioning</a:t>
           </a:r>
         </a:p>
         <a:p>
-          <a:pPr marL="171450" lvl="1" indent="-171450" algn="l" defTabSz="711200">
+          <a:pPr marL="228600" lvl="1" indent="-228600" algn="l" defTabSz="889000">
             <a:lnSpc>
               <a:spcPct val="90000"/>
             </a:lnSpc>
@@ -11122,7 +11130,7 @@
             <a:buChar char="•"/>
           </a:pPr>
           <a:r>
-            <a:rPr lang="en-US" sz="1600" kern="1200" dirty="0">
+            <a:rPr lang="en-US" sz="2000" kern="1200" dirty="0">
               <a:latin typeface="Source Sans Pro" panose="020B0503030403020204" pitchFamily="34" charset="77"/>
             </a:rPr>
             <a:t>Control Logic Allocation</a:t>
@@ -11130,8 +11138,8 @@
         </a:p>
       </dsp:txBody>
       <dsp:txXfrm>
-        <a:off x="3090609" y="1247154"/>
-        <a:ext cx="2475581" cy="1408825"/>
+        <a:off x="3153192" y="2186417"/>
+        <a:ext cx="2337952" cy="2493630"/>
       </dsp:txXfrm>
     </dsp:sp>
     <dsp:sp modelId="{A344AAB6-699E-9540-AD34-59F6011B61B0}">
@@ -11141,8 +11149,8 @@
       </dsp:nvSpPr>
       <dsp:spPr>
         <a:xfrm>
-          <a:off x="6024660" y="1170940"/>
-          <a:ext cx="2628009" cy="1561253"/>
+          <a:off x="6049442" y="2059939"/>
+          <a:ext cx="2590908" cy="2746586"/>
         </a:xfrm>
         <a:prstGeom prst="roundRect">
           <a:avLst/>
@@ -11184,12 +11192,12 @@
         </a:fontRef>
       </dsp:style>
       <dsp:txBody>
-        <a:bodyPr spcFirstLastPara="0" vert="horz" wrap="square" lIns="76200" tIns="76200" rIns="76200" bIns="76200" numCol="1" spcCol="1270" anchor="t" anchorCtr="0">
+        <a:bodyPr spcFirstLastPara="0" vert="horz" wrap="square" lIns="106680" tIns="106680" rIns="106680" bIns="106680" numCol="1" spcCol="1270" anchor="t" anchorCtr="0">
           <a:noAutofit/>
         </a:bodyPr>
         <a:lstStyle/>
         <a:p>
-          <a:pPr marL="0" lvl="0" indent="0" algn="l" defTabSz="889000">
+          <a:pPr marL="0" lvl="0" indent="0" algn="l" defTabSz="1244600">
             <a:lnSpc>
               <a:spcPct val="90000"/>
             </a:lnSpc>
@@ -11202,14 +11210,14 @@
             <a:buNone/>
           </a:pPr>
           <a:r>
-            <a:rPr lang="en-US" sz="2000" b="1" kern="1200" dirty="0">
+            <a:rPr lang="en-US" sz="2800" b="1" kern="1200" dirty="0">
               <a:latin typeface="Source Sans Pro" panose="020B0503030403020204" pitchFamily="34" charset="77"/>
             </a:rPr>
             <a:t>Mapping</a:t>
           </a:r>
         </a:p>
         <a:p>
-          <a:pPr marL="171450" lvl="1" indent="-171450" algn="l" defTabSz="711200">
+          <a:pPr marL="228600" lvl="1" indent="-228600" algn="l" defTabSz="889000">
             <a:lnSpc>
               <a:spcPct val="90000"/>
             </a:lnSpc>
@@ -11222,14 +11230,14 @@
             <a:buChar char="•"/>
           </a:pPr>
           <a:r>
-            <a:rPr lang="en-US" sz="1600" kern="1200" dirty="0">
+            <a:rPr lang="en-US" sz="2000" kern="1200" dirty="0">
               <a:latin typeface="Source Sans Pro" panose="020B0503030403020204" pitchFamily="34" charset="77"/>
             </a:rPr>
             <a:t>Placement and Routing</a:t>
           </a:r>
         </a:p>
         <a:p>
-          <a:pPr marL="171450" lvl="1" indent="-171450" algn="l" defTabSz="711200">
+          <a:pPr marL="228600" lvl="1" indent="-228600" algn="l" defTabSz="889000">
             <a:lnSpc>
               <a:spcPct val="90000"/>
             </a:lnSpc>
@@ -11242,7 +11250,7 @@
             <a:buChar char="•"/>
           </a:pPr>
           <a:r>
-            <a:rPr lang="en-US" sz="1600" kern="1200" dirty="0">
+            <a:rPr lang="en-US" sz="2000" kern="1200" dirty="0">
               <a:latin typeface="Source Sans Pro" panose="020B0503030403020204" pitchFamily="34" charset="77"/>
             </a:rPr>
             <a:t>VC Allocation</a:t>
@@ -11250,8 +11258,8 @@
         </a:p>
       </dsp:txBody>
       <dsp:txXfrm>
-        <a:off x="6100874" y="1247154"/>
-        <a:ext cx="2475581" cy="1408825"/>
+        <a:off x="6175920" y="2186417"/>
+        <a:ext cx="2337952" cy="2493630"/>
       </dsp:txXfrm>
     </dsp:sp>
     <dsp:sp modelId="{1A9B96BC-57CD-C543-8A37-C32EA988B85E}">
@@ -11261,8 +11269,8 @@
       </dsp:nvSpPr>
       <dsp:spPr>
         <a:xfrm>
-          <a:off x="9034926" y="1170940"/>
-          <a:ext cx="2628009" cy="1561253"/>
+          <a:off x="9072169" y="2059939"/>
+          <a:ext cx="2590908" cy="2746586"/>
         </a:xfrm>
         <a:prstGeom prst="roundRect">
           <a:avLst/>
@@ -11304,12 +11312,12 @@
         </a:fontRef>
       </dsp:style>
       <dsp:txBody>
-        <a:bodyPr spcFirstLastPara="0" vert="horz" wrap="square" lIns="76200" tIns="76200" rIns="76200" bIns="76200" numCol="1" spcCol="1270" anchor="t" anchorCtr="0">
+        <a:bodyPr spcFirstLastPara="0" vert="horz" wrap="square" lIns="106680" tIns="106680" rIns="106680" bIns="106680" numCol="1" spcCol="1270" anchor="t" anchorCtr="0">
           <a:noAutofit/>
         </a:bodyPr>
         <a:lstStyle/>
         <a:p>
-          <a:pPr marL="0" lvl="0" indent="0" algn="l" defTabSz="889000">
+          <a:pPr marL="0" lvl="0" indent="0" algn="l" defTabSz="1244600">
             <a:lnSpc>
               <a:spcPct val="90000"/>
             </a:lnSpc>
@@ -11322,14 +11330,14 @@
             <a:buNone/>
           </a:pPr>
           <a:r>
-            <a:rPr lang="en-US" sz="2000" b="1" kern="1200" dirty="0">
+            <a:rPr lang="en-US" sz="2800" b="1" kern="1200" dirty="0">
               <a:latin typeface="Source Sans Pro" panose="020B0503030403020204" pitchFamily="34" charset="77"/>
             </a:rPr>
             <a:t>Simulation</a:t>
           </a:r>
         </a:p>
         <a:p>
-          <a:pPr marL="171450" lvl="1" indent="-171450" algn="l" defTabSz="711200">
+          <a:pPr marL="228600" lvl="1" indent="-228600" algn="l" defTabSz="889000">
             <a:lnSpc>
               <a:spcPct val="90000"/>
             </a:lnSpc>
@@ -11342,14 +11350,14 @@
             <a:buChar char="•"/>
           </a:pPr>
           <a:r>
-            <a:rPr lang="en-US" sz="1600" kern="1200" dirty="0">
+            <a:rPr lang="en-US" sz="2000" kern="1200" dirty="0">
               <a:latin typeface="Source Sans Pro" panose="020B0503030403020204" pitchFamily="34" charset="77"/>
             </a:rPr>
             <a:t>Fast Cycle Accurate Control Simulation</a:t>
           </a:r>
         </a:p>
         <a:p>
-          <a:pPr marL="171450" lvl="1" indent="-171450" algn="l" defTabSz="711200">
+          <a:pPr marL="228600" lvl="1" indent="-228600" algn="l" defTabSz="889000">
             <a:lnSpc>
               <a:spcPct val="90000"/>
             </a:lnSpc>
@@ -11362,37 +11370,37 @@
             <a:buChar char="•"/>
           </a:pPr>
           <a:r>
-            <a:rPr lang="en-US" sz="1600" kern="1200" dirty="0">
+            <a:rPr lang="en-US" sz="2000" kern="1200" dirty="0">
               <a:latin typeface="Source Sans Pro" panose="020B0503030403020204" pitchFamily="34" charset="77"/>
             </a:rPr>
             <a:t>Integrated with </a:t>
           </a:r>
           <a:r>
-            <a:rPr lang="en-US" sz="1600" kern="1200" dirty="0" err="1">
+            <a:rPr lang="en-US" sz="2000" kern="1200" dirty="0" err="1">
               <a:latin typeface="Source Sans Pro" panose="020B0503030403020204" pitchFamily="34" charset="77"/>
             </a:rPr>
             <a:t>DRAMSim</a:t>
           </a:r>
           <a:r>
-            <a:rPr lang="en-US" sz="1600" kern="1200" dirty="0">
+            <a:rPr lang="en-US" sz="2000" kern="1200" dirty="0">
               <a:latin typeface="Source Sans Pro" panose="020B0503030403020204" pitchFamily="34" charset="77"/>
             </a:rPr>
             <a:t> and </a:t>
           </a:r>
           <a:r>
-            <a:rPr lang="en-US" sz="1600" kern="1200" dirty="0" err="1">
+            <a:rPr lang="en-US" sz="2000" kern="1200" dirty="0" err="1">
               <a:latin typeface="Source Sans Pro" panose="020B0503030403020204" pitchFamily="34" charset="77"/>
             </a:rPr>
             <a:t>BookSim</a:t>
           </a:r>
-          <a:endParaRPr lang="en-US" sz="1600" kern="1200" dirty="0">
+          <a:endParaRPr lang="en-US" sz="2000" kern="1200" dirty="0">
             <a:latin typeface="Source Sans Pro" panose="020B0503030403020204" pitchFamily="34" charset="77"/>
           </a:endParaRPr>
         </a:p>
       </dsp:txBody>
       <dsp:txXfrm>
-        <a:off x="9111140" y="1247154"/>
-        <a:ext cx="2475581" cy="1408825"/>
+        <a:off x="9198647" y="2186417"/>
+        <a:ext cx="2337952" cy="2493630"/>
       </dsp:txXfrm>
     </dsp:sp>
   </dsp:spTree>
@@ -18794,6 +18802,439 @@
 </dgm:styleDef>
 </file>
 
+<file path=ppt/notesMasters/notesMaster1.xml><?xml version="1.0" encoding="utf-8"?>
+<p:notesMaster xmlns:a="http://schemas.openxmlformats.org/drawingml/2006/main" xmlns:r="http://schemas.openxmlformats.org/officeDocument/2006/relationships" xmlns:p="http://schemas.openxmlformats.org/presentationml/2006/main">
+  <p:cSld>
+    <p:bg>
+      <p:bgRef idx="1001">
+        <a:schemeClr val="bg1"/>
+      </p:bgRef>
+    </p:bg>
+    <p:spTree>
+      <p:nvGrpSpPr>
+        <p:cNvPr id="1" name=""/>
+        <p:cNvGrpSpPr/>
+        <p:nvPr/>
+      </p:nvGrpSpPr>
+      <p:grpSpPr>
+        <a:xfrm>
+          <a:off x="0" y="0"/>
+          <a:ext cx="0" cy="0"/>
+          <a:chOff x="0" y="0"/>
+          <a:chExt cx="0" cy="0"/>
+        </a:xfrm>
+      </p:grpSpPr>
+      <p:sp>
+        <p:nvSpPr>
+          <p:cNvPr id="2" name="Header Placeholder 1"/>
+          <p:cNvSpPr>
+            <a:spLocks noGrp="1"/>
+          </p:cNvSpPr>
+          <p:nvPr>
+            <p:ph type="hdr" sz="quarter"/>
+          </p:nvPr>
+        </p:nvSpPr>
+        <p:spPr>
+          <a:xfrm>
+            <a:off x="0" y="0"/>
+            <a:ext cx="2971800" cy="458788"/>
+          </a:xfrm>
+          <a:prstGeom prst="rect">
+            <a:avLst/>
+          </a:prstGeom>
+        </p:spPr>
+        <p:txBody>
+          <a:bodyPr vert="horz" lIns="91440" tIns="45720" rIns="91440" bIns="45720" rtlCol="0"/>
+          <a:lstStyle>
+            <a:lvl1pPr algn="l">
+              <a:defRPr sz="1200"/>
+            </a:lvl1pPr>
+          </a:lstStyle>
+          <a:p>
+            <a:endParaRPr lang="en-US"/>
+          </a:p>
+        </p:txBody>
+      </p:sp>
+      <p:sp>
+        <p:nvSpPr>
+          <p:cNvPr id="3" name="Date Placeholder 2"/>
+          <p:cNvSpPr>
+            <a:spLocks noGrp="1"/>
+          </p:cNvSpPr>
+          <p:nvPr>
+            <p:ph type="dt" idx="1"/>
+          </p:nvPr>
+        </p:nvSpPr>
+        <p:spPr>
+          <a:xfrm>
+            <a:off x="3884613" y="0"/>
+            <a:ext cx="2971800" cy="458788"/>
+          </a:xfrm>
+          <a:prstGeom prst="rect">
+            <a:avLst/>
+          </a:prstGeom>
+        </p:spPr>
+        <p:txBody>
+          <a:bodyPr vert="horz" lIns="91440" tIns="45720" rIns="91440" bIns="45720" rtlCol="0"/>
+          <a:lstStyle>
+            <a:lvl1pPr algn="r">
+              <a:defRPr sz="1200"/>
+            </a:lvl1pPr>
+          </a:lstStyle>
+          <a:p>
+            <a:fld id="{7A42072F-3F53-2D47-B28A-DE283BEF777E}" type="datetimeFigureOut">
+              <a:rPr lang="en-US" smtClean="0"/>
+              <a:t>9/11/18</a:t>
+            </a:fld>
+            <a:endParaRPr lang="en-US"/>
+          </a:p>
+        </p:txBody>
+      </p:sp>
+      <p:sp>
+        <p:nvSpPr>
+          <p:cNvPr id="4" name="Slide Image Placeholder 3"/>
+          <p:cNvSpPr>
+            <a:spLocks noGrp="1" noRot="1" noChangeAspect="1"/>
+          </p:cNvSpPr>
+          <p:nvPr>
+            <p:ph type="sldImg" idx="2"/>
+          </p:nvPr>
+        </p:nvSpPr>
+        <p:spPr>
+          <a:xfrm>
+            <a:off x="685800" y="1143000"/>
+            <a:ext cx="5486400" cy="3086100"/>
+          </a:xfrm>
+          <a:prstGeom prst="rect">
+            <a:avLst/>
+          </a:prstGeom>
+          <a:noFill/>
+          <a:ln w="12700">
+            <a:solidFill>
+              <a:prstClr val="black"/>
+            </a:solidFill>
+          </a:ln>
+        </p:spPr>
+        <p:txBody>
+          <a:bodyPr vert="horz" lIns="91440" tIns="45720" rIns="91440" bIns="45720" rtlCol="0" anchor="ctr"/>
+          <a:lstStyle/>
+          <a:p>
+            <a:endParaRPr lang="en-US"/>
+          </a:p>
+        </p:txBody>
+      </p:sp>
+      <p:sp>
+        <p:nvSpPr>
+          <p:cNvPr id="5" name="Notes Placeholder 4"/>
+          <p:cNvSpPr>
+            <a:spLocks noGrp="1"/>
+          </p:cNvSpPr>
+          <p:nvPr>
+            <p:ph type="body" sz="quarter" idx="3"/>
+          </p:nvPr>
+        </p:nvSpPr>
+        <p:spPr>
+          <a:xfrm>
+            <a:off x="685800" y="4400550"/>
+            <a:ext cx="5486400" cy="3600450"/>
+          </a:xfrm>
+          <a:prstGeom prst="rect">
+            <a:avLst/>
+          </a:prstGeom>
+        </p:spPr>
+        <p:txBody>
+          <a:bodyPr vert="horz" lIns="91440" tIns="45720" rIns="91440" bIns="45720" rtlCol="0"/>
+          <a:lstStyle/>
+          <a:p>
+            <a:pPr lvl="0"/>
+            <a:r>
+              <a:rPr lang="en-US"/>
+              <a:t>Edit Master text styles</a:t>
+            </a:r>
+          </a:p>
+          <a:p>
+            <a:pPr lvl="1"/>
+            <a:r>
+              <a:rPr lang="en-US"/>
+              <a:t>Second level</a:t>
+            </a:r>
+          </a:p>
+          <a:p>
+            <a:pPr lvl="2"/>
+            <a:r>
+              <a:rPr lang="en-US"/>
+              <a:t>Third level</a:t>
+            </a:r>
+          </a:p>
+          <a:p>
+            <a:pPr lvl="3"/>
+            <a:r>
+              <a:rPr lang="en-US"/>
+              <a:t>Fourth level</a:t>
+            </a:r>
+          </a:p>
+          <a:p>
+            <a:pPr lvl="4"/>
+            <a:r>
+              <a:rPr lang="en-US"/>
+              <a:t>Fifth level</a:t>
+            </a:r>
+          </a:p>
+        </p:txBody>
+      </p:sp>
+      <p:sp>
+        <p:nvSpPr>
+          <p:cNvPr id="6" name="Footer Placeholder 5"/>
+          <p:cNvSpPr>
+            <a:spLocks noGrp="1"/>
+          </p:cNvSpPr>
+          <p:nvPr>
+            <p:ph type="ftr" sz="quarter" idx="4"/>
+          </p:nvPr>
+        </p:nvSpPr>
+        <p:spPr>
+          <a:xfrm>
+            <a:off x="0" y="8685213"/>
+            <a:ext cx="2971800" cy="458787"/>
+          </a:xfrm>
+          <a:prstGeom prst="rect">
+            <a:avLst/>
+          </a:prstGeom>
+        </p:spPr>
+        <p:txBody>
+          <a:bodyPr vert="horz" lIns="91440" tIns="45720" rIns="91440" bIns="45720" rtlCol="0" anchor="b"/>
+          <a:lstStyle>
+            <a:lvl1pPr algn="l">
+              <a:defRPr sz="1200"/>
+            </a:lvl1pPr>
+          </a:lstStyle>
+          <a:p>
+            <a:endParaRPr lang="en-US"/>
+          </a:p>
+        </p:txBody>
+      </p:sp>
+      <p:sp>
+        <p:nvSpPr>
+          <p:cNvPr id="7" name="Slide Number Placeholder 6"/>
+          <p:cNvSpPr>
+            <a:spLocks noGrp="1"/>
+          </p:cNvSpPr>
+          <p:nvPr>
+            <p:ph type="sldNum" sz="quarter" idx="5"/>
+          </p:nvPr>
+        </p:nvSpPr>
+        <p:spPr>
+          <a:xfrm>
+            <a:off x="3884613" y="8685213"/>
+            <a:ext cx="2971800" cy="458787"/>
+          </a:xfrm>
+          <a:prstGeom prst="rect">
+            <a:avLst/>
+          </a:prstGeom>
+        </p:spPr>
+        <p:txBody>
+          <a:bodyPr vert="horz" lIns="91440" tIns="45720" rIns="91440" bIns="45720" rtlCol="0" anchor="b"/>
+          <a:lstStyle>
+            <a:lvl1pPr algn="r">
+              <a:defRPr sz="1200"/>
+            </a:lvl1pPr>
+          </a:lstStyle>
+          <a:p>
+            <a:fld id="{878EC928-24A1-4D42-97E8-66937E0B1D07}" type="slidenum">
+              <a:rPr lang="en-US" smtClean="0"/>
+              <a:t>‹#›</a:t>
+            </a:fld>
+            <a:endParaRPr lang="en-US"/>
+          </a:p>
+        </p:txBody>
+      </p:sp>
+    </p:spTree>
+    <p:extLst>
+      <p:ext uri="{BB962C8B-B14F-4D97-AF65-F5344CB8AC3E}">
+        <p14:creationId xmlns:p14="http://schemas.microsoft.com/office/powerpoint/2010/main" val="2822319475"/>
+      </p:ext>
+    </p:extLst>
+  </p:cSld>
+  <p:clrMap bg1="lt1" tx1="dk1" bg2="lt2" tx2="dk2" accent1="accent1" accent2="accent2" accent3="accent3" accent4="accent4" accent5="accent5" accent6="accent6" hlink="hlink" folHlink="folHlink"/>
+  <p:notesStyle>
+    <a:lvl1pPr marL="0" algn="l" defTabSz="914400" rtl="0" eaLnBrk="1" latinLnBrk="0" hangingPunct="1">
+      <a:defRPr sz="1200" kern="1200">
+        <a:solidFill>
+          <a:schemeClr val="tx1"/>
+        </a:solidFill>
+        <a:latin typeface="+mn-lt"/>
+        <a:ea typeface="+mn-ea"/>
+        <a:cs typeface="+mn-cs"/>
+      </a:defRPr>
+    </a:lvl1pPr>
+    <a:lvl2pPr marL="457200" algn="l" defTabSz="914400" rtl="0" eaLnBrk="1" latinLnBrk="0" hangingPunct="1">
+      <a:defRPr sz="1200" kern="1200">
+        <a:solidFill>
+          <a:schemeClr val="tx1"/>
+        </a:solidFill>
+        <a:latin typeface="+mn-lt"/>
+        <a:ea typeface="+mn-ea"/>
+        <a:cs typeface="+mn-cs"/>
+      </a:defRPr>
+    </a:lvl2pPr>
+    <a:lvl3pPr marL="914400" algn="l" defTabSz="914400" rtl="0" eaLnBrk="1" latinLnBrk="0" hangingPunct="1">
+      <a:defRPr sz="1200" kern="1200">
+        <a:solidFill>
+          <a:schemeClr val="tx1"/>
+        </a:solidFill>
+        <a:latin typeface="+mn-lt"/>
+        <a:ea typeface="+mn-ea"/>
+        <a:cs typeface="+mn-cs"/>
+      </a:defRPr>
+    </a:lvl3pPr>
+    <a:lvl4pPr marL="1371600" algn="l" defTabSz="914400" rtl="0" eaLnBrk="1" latinLnBrk="0" hangingPunct="1">
+      <a:defRPr sz="1200" kern="1200">
+        <a:solidFill>
+          <a:schemeClr val="tx1"/>
+        </a:solidFill>
+        <a:latin typeface="+mn-lt"/>
+        <a:ea typeface="+mn-ea"/>
+        <a:cs typeface="+mn-cs"/>
+      </a:defRPr>
+    </a:lvl4pPr>
+    <a:lvl5pPr marL="1828800" algn="l" defTabSz="914400" rtl="0" eaLnBrk="1" latinLnBrk="0" hangingPunct="1">
+      <a:defRPr sz="1200" kern="1200">
+        <a:solidFill>
+          <a:schemeClr val="tx1"/>
+        </a:solidFill>
+        <a:latin typeface="+mn-lt"/>
+        <a:ea typeface="+mn-ea"/>
+        <a:cs typeface="+mn-cs"/>
+      </a:defRPr>
+    </a:lvl5pPr>
+    <a:lvl6pPr marL="2286000" algn="l" defTabSz="914400" rtl="0" eaLnBrk="1" latinLnBrk="0" hangingPunct="1">
+      <a:defRPr sz="1200" kern="1200">
+        <a:solidFill>
+          <a:schemeClr val="tx1"/>
+        </a:solidFill>
+        <a:latin typeface="+mn-lt"/>
+        <a:ea typeface="+mn-ea"/>
+        <a:cs typeface="+mn-cs"/>
+      </a:defRPr>
+    </a:lvl6pPr>
+    <a:lvl7pPr marL="2743200" algn="l" defTabSz="914400" rtl="0" eaLnBrk="1" latinLnBrk="0" hangingPunct="1">
+      <a:defRPr sz="1200" kern="1200">
+        <a:solidFill>
+          <a:schemeClr val="tx1"/>
+        </a:solidFill>
+        <a:latin typeface="+mn-lt"/>
+        <a:ea typeface="+mn-ea"/>
+        <a:cs typeface="+mn-cs"/>
+      </a:defRPr>
+    </a:lvl7pPr>
+    <a:lvl8pPr marL="3200400" algn="l" defTabSz="914400" rtl="0" eaLnBrk="1" latinLnBrk="0" hangingPunct="1">
+      <a:defRPr sz="1200" kern="1200">
+        <a:solidFill>
+          <a:schemeClr val="tx1"/>
+        </a:solidFill>
+        <a:latin typeface="+mn-lt"/>
+        <a:ea typeface="+mn-ea"/>
+        <a:cs typeface="+mn-cs"/>
+      </a:defRPr>
+    </a:lvl8pPr>
+    <a:lvl9pPr marL="3657600" algn="l" defTabSz="914400" rtl="0" eaLnBrk="1" latinLnBrk="0" hangingPunct="1">
+      <a:defRPr sz="1200" kern="1200">
+        <a:solidFill>
+          <a:schemeClr val="tx1"/>
+        </a:solidFill>
+        <a:latin typeface="+mn-lt"/>
+        <a:ea typeface="+mn-ea"/>
+        <a:cs typeface="+mn-cs"/>
+      </a:defRPr>
+    </a:lvl9pPr>
+  </p:notesStyle>
+</p:notesMaster>
+</file>
+
+<file path=ppt/notesSlides/notesSlide1.xml><?xml version="1.0" encoding="utf-8"?>
+<p:notes xmlns:a="http://schemas.openxmlformats.org/drawingml/2006/main" xmlns:r="http://schemas.openxmlformats.org/officeDocument/2006/relationships" xmlns:p="http://schemas.openxmlformats.org/presentationml/2006/main">
+  <p:cSld>
+    <p:spTree>
+      <p:nvGrpSpPr>
+        <p:cNvPr id="1" name=""/>
+        <p:cNvGrpSpPr/>
+        <p:nvPr/>
+      </p:nvGrpSpPr>
+      <p:grpSpPr>
+        <a:xfrm>
+          <a:off x="0" y="0"/>
+          <a:ext cx="0" cy="0"/>
+          <a:chOff x="0" y="0"/>
+          <a:chExt cx="0" cy="0"/>
+        </a:xfrm>
+      </p:grpSpPr>
+      <p:sp>
+        <p:nvSpPr>
+          <p:cNvPr id="2" name="Slide Image Placeholder 1"/>
+          <p:cNvSpPr>
+            <a:spLocks noGrp="1" noRot="1" noChangeAspect="1"/>
+          </p:cNvSpPr>
+          <p:nvPr>
+            <p:ph type="sldImg"/>
+          </p:nvPr>
+        </p:nvSpPr>
+        <p:spPr/>
+      </p:sp>
+      <p:sp>
+        <p:nvSpPr>
+          <p:cNvPr id="3" name="Notes Placeholder 2"/>
+          <p:cNvSpPr>
+            <a:spLocks noGrp="1"/>
+          </p:cNvSpPr>
+          <p:nvPr>
+            <p:ph type="body" idx="1"/>
+          </p:nvPr>
+        </p:nvSpPr>
+        <p:spPr/>
+        <p:txBody>
+          <a:bodyPr/>
+          <a:lstStyle/>
+          <a:p>
+            <a:endParaRPr lang="en-US" dirty="0"/>
+          </a:p>
+        </p:txBody>
+      </p:sp>
+      <p:sp>
+        <p:nvSpPr>
+          <p:cNvPr id="4" name="Slide Number Placeholder 3"/>
+          <p:cNvSpPr>
+            <a:spLocks noGrp="1"/>
+          </p:cNvSpPr>
+          <p:nvPr>
+            <p:ph type="sldNum" sz="quarter" idx="5"/>
+          </p:nvPr>
+        </p:nvSpPr>
+        <p:spPr/>
+        <p:txBody>
+          <a:bodyPr/>
+          <a:lstStyle/>
+          <a:p>
+            <a:fld id="{878EC928-24A1-4D42-97E8-66937E0B1D07}" type="slidenum">
+              <a:rPr lang="en-US" smtClean="0"/>
+              <a:t>1</a:t>
+            </a:fld>
+            <a:endParaRPr lang="en-US"/>
+          </a:p>
+        </p:txBody>
+      </p:sp>
+    </p:spTree>
+    <p:extLst>
+      <p:ext uri="{BB962C8B-B14F-4D97-AF65-F5344CB8AC3E}">
+        <p14:creationId xmlns:p14="http://schemas.microsoft.com/office/powerpoint/2010/main" val="3558992628"/>
+      </p:ext>
+    </p:extLst>
+  </p:cSld>
+  <p:clrMapOvr>
+    <a:masterClrMapping/>
+  </p:clrMapOvr>
+</p:notes>
+</file>
+
 <file path=ppt/slideLayouts/slideLayout1.xml><?xml version="1.0" encoding="utf-8"?>
 <p:sldLayout xmlns:a="http://schemas.openxmlformats.org/drawingml/2006/main" xmlns:r="http://schemas.openxmlformats.org/officeDocument/2006/relationships" xmlns:p="http://schemas.openxmlformats.org/presentationml/2006/main" type="title" preserve="1">
   <p:cSld name="Title Slide">
@@ -18941,7 +19382,7 @@
           <a:p>
             <a:fld id="{207B30AF-5B0B-1F4F-88C4-9E49E2733A4F}" type="datetimeFigureOut">
               <a:rPr lang="en-US" smtClean="0"/>
-              <a:t>9/10/18</a:t>
+              <a:t>9/11/18</a:t>
             </a:fld>
             <a:endParaRPr lang="en-US"/>
           </a:p>
@@ -19139,7 +19580,7 @@
           <a:p>
             <a:fld id="{207B30AF-5B0B-1F4F-88C4-9E49E2733A4F}" type="datetimeFigureOut">
               <a:rPr lang="en-US" smtClean="0"/>
-              <a:t>9/10/18</a:t>
+              <a:t>9/11/18</a:t>
             </a:fld>
             <a:endParaRPr lang="en-US"/>
           </a:p>
@@ -19347,7 +19788,7 @@
           <a:p>
             <a:fld id="{207B30AF-5B0B-1F4F-88C4-9E49E2733A4F}" type="datetimeFigureOut">
               <a:rPr lang="en-US" smtClean="0"/>
-              <a:t>9/10/18</a:t>
+              <a:t>9/11/18</a:t>
             </a:fld>
             <a:endParaRPr lang="en-US"/>
           </a:p>
@@ -19545,7 +19986,7 @@
           <a:p>
             <a:fld id="{207B30AF-5B0B-1F4F-88C4-9E49E2733A4F}" type="datetimeFigureOut">
               <a:rPr lang="en-US" smtClean="0"/>
-              <a:t>9/10/18</a:t>
+              <a:t>9/11/18</a:t>
             </a:fld>
             <a:endParaRPr lang="en-US"/>
           </a:p>
@@ -19820,7 +20261,7 @@
           <a:p>
             <a:fld id="{207B30AF-5B0B-1F4F-88C4-9E49E2733A4F}" type="datetimeFigureOut">
               <a:rPr lang="en-US" smtClean="0"/>
-              <a:t>9/10/18</a:t>
+              <a:t>9/11/18</a:t>
             </a:fld>
             <a:endParaRPr lang="en-US"/>
           </a:p>
@@ -20085,7 +20526,7 @@
           <a:p>
             <a:fld id="{207B30AF-5B0B-1F4F-88C4-9E49E2733A4F}" type="datetimeFigureOut">
               <a:rPr lang="en-US" smtClean="0"/>
-              <a:t>9/10/18</a:t>
+              <a:t>9/11/18</a:t>
             </a:fld>
             <a:endParaRPr lang="en-US"/>
           </a:p>
@@ -20497,7 +20938,7 @@
           <a:p>
             <a:fld id="{207B30AF-5B0B-1F4F-88C4-9E49E2733A4F}" type="datetimeFigureOut">
               <a:rPr lang="en-US" smtClean="0"/>
-              <a:t>9/10/18</a:t>
+              <a:t>9/11/18</a:t>
             </a:fld>
             <a:endParaRPr lang="en-US"/>
           </a:p>
@@ -20638,7 +21079,7 @@
           <a:p>
             <a:fld id="{207B30AF-5B0B-1F4F-88C4-9E49E2733A4F}" type="datetimeFigureOut">
               <a:rPr lang="en-US" smtClean="0"/>
-              <a:t>9/10/18</a:t>
+              <a:t>9/11/18</a:t>
             </a:fld>
             <a:endParaRPr lang="en-US"/>
           </a:p>
@@ -20751,7 +21192,7 @@
           <a:p>
             <a:fld id="{207B30AF-5B0B-1F4F-88C4-9E49E2733A4F}" type="datetimeFigureOut">
               <a:rPr lang="en-US" smtClean="0"/>
-              <a:t>9/10/18</a:t>
+              <a:t>9/11/18</a:t>
             </a:fld>
             <a:endParaRPr lang="en-US"/>
           </a:p>
@@ -21062,7 +21503,7 @@
           <a:p>
             <a:fld id="{207B30AF-5B0B-1F4F-88C4-9E49E2733A4F}" type="datetimeFigureOut">
               <a:rPr lang="en-US" smtClean="0"/>
-              <a:t>9/10/18</a:t>
+              <a:t>9/11/18</a:t>
             </a:fld>
             <a:endParaRPr lang="en-US"/>
           </a:p>
@@ -21350,7 +21791,7 @@
           <a:p>
             <a:fld id="{207B30AF-5B0B-1F4F-88C4-9E49E2733A4F}" type="datetimeFigureOut">
               <a:rPr lang="en-US" smtClean="0"/>
-              <a:t>9/10/18</a:t>
+              <a:t>9/11/18</a:t>
             </a:fld>
             <a:endParaRPr lang="en-US"/>
           </a:p>
@@ -21591,7 +22032,7 @@
           <a:p>
             <a:fld id="{207B30AF-5B0B-1F4F-88C4-9E49E2733A4F}" type="datetimeFigureOut">
               <a:rPr lang="en-US" smtClean="0"/>
-              <a:t>9/10/18</a:t>
+              <a:t>9/11/18</a:t>
             </a:fld>
             <a:endParaRPr lang="en-US"/>
           </a:p>
@@ -22008,6 +22449,64 @@
           <a:chExt cx="0" cy="0"/>
         </a:xfrm>
       </p:grpSpPr>
+      <p:sp>
+        <p:nvSpPr>
+          <p:cNvPr id="3" name="Right Arrow 2">
+            <a:extLst>
+              <a:ext uri="{FF2B5EF4-FFF2-40B4-BE49-F238E27FC236}">
+                <a16:creationId xmlns:a16="http://schemas.microsoft.com/office/drawing/2014/main" id="{CA433424-EA28-444E-8954-4C3B5CF1BCC2}"/>
+              </a:ext>
+            </a:extLst>
+          </p:cNvPr>
+          <p:cNvSpPr/>
+          <p:nvPr/>
+        </p:nvSpPr>
+        <p:spPr>
+          <a:xfrm>
+            <a:off x="1422400" y="4690534"/>
+            <a:ext cx="9347200" cy="1117601"/>
+          </a:xfrm>
+          <a:prstGeom prst="rightArrow">
+            <a:avLst/>
+          </a:prstGeom>
+        </p:spPr>
+        <p:style>
+          <a:lnRef idx="0">
+            <a:schemeClr val="dk1">
+              <a:hueOff val="0"/>
+              <a:satOff val="0"/>
+              <a:lumOff val="0"/>
+              <a:alphaOff val="0"/>
+            </a:schemeClr>
+          </a:lnRef>
+          <a:fillRef idx="1">
+            <a:schemeClr val="accent2">
+              <a:tint val="40000"/>
+              <a:hueOff val="0"/>
+              <a:satOff val="0"/>
+              <a:lumOff val="0"/>
+              <a:alphaOff val="0"/>
+            </a:schemeClr>
+          </a:fillRef>
+          <a:effectRef idx="0">
+            <a:schemeClr val="accent2">
+              <a:tint val="40000"/>
+              <a:hueOff val="0"/>
+              <a:satOff val="0"/>
+              <a:lumOff val="0"/>
+              <a:alphaOff val="0"/>
+            </a:schemeClr>
+          </a:effectRef>
+          <a:fontRef idx="minor">
+            <a:schemeClr val="dk1">
+              <a:hueOff val="0"/>
+              <a:satOff val="0"/>
+              <a:lumOff val="0"/>
+              <a:alphaOff val="0"/>
+            </a:schemeClr>
+          </a:fontRef>
+        </p:style>
+      </p:sp>
       <p:graphicFrame>
         <p:nvGraphicFramePr>
           <p:cNvPr id="4" name="Diagram 3">
@@ -22032,7 +22531,7 @@
         </p:xfrm>
         <a:graphic>
           <a:graphicData uri="http://schemas.openxmlformats.org/drawingml/2006/diagram">
-            <dgm:relIds xmlns:dgm="http://schemas.openxmlformats.org/drawingml/2006/diagram" xmlns:r="http://schemas.openxmlformats.org/officeDocument/2006/relationships" r:dm="rId2" r:lo="rId3" r:qs="rId4" r:cs="rId5"/>
+            <dgm:relIds xmlns:dgm="http://schemas.openxmlformats.org/drawingml/2006/diagram" xmlns:r="http://schemas.openxmlformats.org/officeDocument/2006/relationships" r:dm="rId3" r:lo="rId4" r:qs="rId5" r:cs="rId6"/>
           </a:graphicData>
         </a:graphic>
       </p:graphicFrame>
@@ -22195,14 +22694,14 @@
           <p:nvPr>
             <p:extLst>
               <p:ext uri="{D42A27DB-BD31-4B8C-83A1-F6EECF244321}">
-                <p14:modId xmlns:p14="http://schemas.microsoft.com/office/powerpoint/2010/main" val="3610245010"/>
+                <p14:modId xmlns:p14="http://schemas.microsoft.com/office/powerpoint/2010/main" val="1146834057"/>
               </p:ext>
             </p:extLst>
           </p:nvPr>
         </p:nvGraphicFramePr>
         <p:xfrm>
-          <a:off x="338667" y="719667"/>
-          <a:ext cx="11667066" cy="3903134"/>
+          <a:off x="372533" y="414867"/>
+          <a:ext cx="11667066" cy="6866466"/>
         </p:xfrm>
         <a:graphic>
           <a:graphicData uri="http://schemas.openxmlformats.org/drawingml/2006/diagram">
@@ -22574,4 +23073,299 @@
     </a:ext>
   </a:extLst>
 </a:theme>
+</file>
+
+<file path=ppt/theme/theme2.xml><?xml version="1.0" encoding="utf-8"?>
+<a:theme xmlns:a="http://schemas.openxmlformats.org/drawingml/2006/main" name="Office Theme">
+  <a:themeElements>
+    <a:clrScheme name="Office">
+      <a:dk1>
+        <a:sysClr val="windowText" lastClr="000000"/>
+      </a:dk1>
+      <a:lt1>
+        <a:sysClr val="window" lastClr="FFFFFF"/>
+      </a:lt1>
+      <a:dk2>
+        <a:srgbClr val="44546A"/>
+      </a:dk2>
+      <a:lt2>
+        <a:srgbClr val="E7E6E6"/>
+      </a:lt2>
+      <a:accent1>
+        <a:srgbClr val="4472C4"/>
+      </a:accent1>
+      <a:accent2>
+        <a:srgbClr val="ED7D31"/>
+      </a:accent2>
+      <a:accent3>
+        <a:srgbClr val="A5A5A5"/>
+      </a:accent3>
+      <a:accent4>
+        <a:srgbClr val="FFC000"/>
+      </a:accent4>
+      <a:accent5>
+        <a:srgbClr val="5B9BD5"/>
+      </a:accent5>
+      <a:accent6>
+        <a:srgbClr val="70AD47"/>
+      </a:accent6>
+      <a:hlink>
+        <a:srgbClr val="0563C1"/>
+      </a:hlink>
+      <a:folHlink>
+        <a:srgbClr val="954F72"/>
+      </a:folHlink>
+    </a:clrScheme>
+    <a:fontScheme name="Office">
+      <a:majorFont>
+        <a:latin typeface="Calibri Light" panose="020F0302020204030204"/>
+        <a:ea typeface=""/>
+        <a:cs typeface=""/>
+        <a:font script="Jpan" typeface="游ゴシック Light"/>
+        <a:font script="Hang" typeface="맑은 고딕"/>
+        <a:font script="Hans" typeface="等线 Light"/>
+        <a:font script="Hant" typeface="新細明體"/>
+        <a:font script="Arab" typeface="Times New Roman"/>
+        <a:font script="Hebr" typeface="Times New Roman"/>
+        <a:font script="Thai" typeface="Angsana New"/>
+        <a:font script="Ethi" typeface="Nyala"/>
+        <a:font script="Beng" typeface="Vrinda"/>
+        <a:font script="Gujr" typeface="Shruti"/>
+        <a:font script="Khmr" typeface="MoolBoran"/>
+        <a:font script="Knda" typeface="Tunga"/>
+        <a:font script="Guru" typeface="Raavi"/>
+        <a:font script="Cans" typeface="Euphemia"/>
+        <a:font script="Cher" typeface="Plantagenet Cherokee"/>
+        <a:font script="Yiii" typeface="Microsoft Yi Baiti"/>
+        <a:font script="Tibt" typeface="Microsoft Himalaya"/>
+        <a:font script="Thaa" typeface="MV Boli"/>
+        <a:font script="Deva" typeface="Mangal"/>
+        <a:font script="Telu" typeface="Gautami"/>
+        <a:font script="Taml" typeface="Latha"/>
+        <a:font script="Syrc" typeface="Estrangelo Edessa"/>
+        <a:font script="Orya" typeface="Kalinga"/>
+        <a:font script="Mlym" typeface="Kartika"/>
+        <a:font script="Laoo" typeface="DokChampa"/>
+        <a:font script="Sinh" typeface="Iskoola Pota"/>
+        <a:font script="Mong" typeface="Mongolian Baiti"/>
+        <a:font script="Viet" typeface="Times New Roman"/>
+        <a:font script="Uigh" typeface="Microsoft Uighur"/>
+        <a:font script="Geor" typeface="Sylfaen"/>
+        <a:font script="Armn" typeface="Arial"/>
+        <a:font script="Bugi" typeface="Leelawadee UI"/>
+        <a:font script="Bopo" typeface="Microsoft JhengHei"/>
+        <a:font script="Java" typeface="Javanese Text"/>
+        <a:font script="Lisu" typeface="Segoe UI"/>
+        <a:font script="Mymr" typeface="Myanmar Text"/>
+        <a:font script="Nkoo" typeface="Ebrima"/>
+        <a:font script="Olck" typeface="Nirmala UI"/>
+        <a:font script="Osma" typeface="Ebrima"/>
+        <a:font script="Phag" typeface="Phagspa"/>
+        <a:font script="Syrn" typeface="Estrangelo Edessa"/>
+        <a:font script="Syrj" typeface="Estrangelo Edessa"/>
+        <a:font script="Syre" typeface="Estrangelo Edessa"/>
+        <a:font script="Sora" typeface="Nirmala UI"/>
+        <a:font script="Tale" typeface="Microsoft Tai Le"/>
+        <a:font script="Talu" typeface="Microsoft New Tai Lue"/>
+        <a:font script="Tfng" typeface="Ebrima"/>
+      </a:majorFont>
+      <a:minorFont>
+        <a:latin typeface="Calibri" panose="020F0502020204030204"/>
+        <a:ea typeface=""/>
+        <a:cs typeface=""/>
+        <a:font script="Jpan" typeface="游ゴシック"/>
+        <a:font script="Hang" typeface="맑은 고딕"/>
+        <a:font script="Hans" typeface="等线"/>
+        <a:font script="Hant" typeface="新細明體"/>
+        <a:font script="Arab" typeface="Arial"/>
+        <a:font script="Hebr" typeface="Arial"/>
+        <a:font script="Thai" typeface="Cordia New"/>
+        <a:font script="Ethi" typeface="Nyala"/>
+        <a:font script="Beng" typeface="Vrinda"/>
+        <a:font script="Gujr" typeface="Shruti"/>
+        <a:font script="Khmr" typeface="DaunPenh"/>
+        <a:font script="Knda" typeface="Tunga"/>
+        <a:font script="Guru" typeface="Raavi"/>
+        <a:font script="Cans" typeface="Euphemia"/>
+        <a:font script="Cher" typeface="Plantagenet Cherokee"/>
+        <a:font script="Yiii" typeface="Microsoft Yi Baiti"/>
+        <a:font script="Tibt" typeface="Microsoft Himalaya"/>
+        <a:font script="Thaa" typeface="MV Boli"/>
+        <a:font script="Deva" typeface="Mangal"/>
+        <a:font script="Telu" typeface="Gautami"/>
+        <a:font script="Taml" typeface="Latha"/>
+        <a:font script="Syrc" typeface="Estrangelo Edessa"/>
+        <a:font script="Orya" typeface="Kalinga"/>
+        <a:font script="Mlym" typeface="Kartika"/>
+        <a:font script="Laoo" typeface="DokChampa"/>
+        <a:font script="Sinh" typeface="Iskoola Pota"/>
+        <a:font script="Mong" typeface="Mongolian Baiti"/>
+        <a:font script="Viet" typeface="Arial"/>
+        <a:font script="Uigh" typeface="Microsoft Uighur"/>
+        <a:font script="Geor" typeface="Sylfaen"/>
+        <a:font script="Armn" typeface="Arial"/>
+        <a:font script="Bugi" typeface="Leelawadee UI"/>
+        <a:font script="Bopo" typeface="Microsoft JhengHei"/>
+        <a:font script="Java" typeface="Javanese Text"/>
+        <a:font script="Lisu" typeface="Segoe UI"/>
+        <a:font script="Mymr" typeface="Myanmar Text"/>
+        <a:font script="Nkoo" typeface="Ebrima"/>
+        <a:font script="Olck" typeface="Nirmala UI"/>
+        <a:font script="Osma" typeface="Ebrima"/>
+        <a:font script="Phag" typeface="Phagspa"/>
+        <a:font script="Syrn" typeface="Estrangelo Edessa"/>
+        <a:font script="Syrj" typeface="Estrangelo Edessa"/>
+        <a:font script="Syre" typeface="Estrangelo Edessa"/>
+        <a:font script="Sora" typeface="Nirmala UI"/>
+        <a:font script="Tale" typeface="Microsoft Tai Le"/>
+        <a:font script="Talu" typeface="Microsoft New Tai Lue"/>
+        <a:font script="Tfng" typeface="Ebrima"/>
+      </a:minorFont>
+    </a:fontScheme>
+    <a:fmtScheme name="Office">
+      <a:fillStyleLst>
+        <a:solidFill>
+          <a:schemeClr val="phClr"/>
+        </a:solidFill>
+        <a:gradFill rotWithShape="1">
+          <a:gsLst>
+            <a:gs pos="0">
+              <a:schemeClr val="phClr">
+                <a:lumMod val="110000"/>
+                <a:satMod val="105000"/>
+                <a:tint val="67000"/>
+              </a:schemeClr>
+            </a:gs>
+            <a:gs pos="50000">
+              <a:schemeClr val="phClr">
+                <a:lumMod val="105000"/>
+                <a:satMod val="103000"/>
+                <a:tint val="73000"/>
+              </a:schemeClr>
+            </a:gs>
+            <a:gs pos="100000">
+              <a:schemeClr val="phClr">
+                <a:lumMod val="105000"/>
+                <a:satMod val="109000"/>
+                <a:tint val="81000"/>
+              </a:schemeClr>
+            </a:gs>
+          </a:gsLst>
+          <a:lin ang="5400000" scaled="0"/>
+        </a:gradFill>
+        <a:gradFill rotWithShape="1">
+          <a:gsLst>
+            <a:gs pos="0">
+              <a:schemeClr val="phClr">
+                <a:satMod val="103000"/>
+                <a:lumMod val="102000"/>
+                <a:tint val="94000"/>
+              </a:schemeClr>
+            </a:gs>
+            <a:gs pos="50000">
+              <a:schemeClr val="phClr">
+                <a:satMod val="110000"/>
+                <a:lumMod val="100000"/>
+                <a:shade val="100000"/>
+              </a:schemeClr>
+            </a:gs>
+            <a:gs pos="100000">
+              <a:schemeClr val="phClr">
+                <a:lumMod val="99000"/>
+                <a:satMod val="120000"/>
+                <a:shade val="78000"/>
+              </a:schemeClr>
+            </a:gs>
+          </a:gsLst>
+          <a:lin ang="5400000" scaled="0"/>
+        </a:gradFill>
+      </a:fillStyleLst>
+      <a:lnStyleLst>
+        <a:ln w="6350" cap="flat" cmpd="sng" algn="ctr">
+          <a:solidFill>
+            <a:schemeClr val="phClr"/>
+          </a:solidFill>
+          <a:prstDash val="solid"/>
+          <a:miter lim="800000"/>
+        </a:ln>
+        <a:ln w="12700" cap="flat" cmpd="sng" algn="ctr">
+          <a:solidFill>
+            <a:schemeClr val="phClr"/>
+          </a:solidFill>
+          <a:prstDash val="solid"/>
+          <a:miter lim="800000"/>
+        </a:ln>
+        <a:ln w="19050" cap="flat" cmpd="sng" algn="ctr">
+          <a:solidFill>
+            <a:schemeClr val="phClr"/>
+          </a:solidFill>
+          <a:prstDash val="solid"/>
+          <a:miter lim="800000"/>
+        </a:ln>
+      </a:lnStyleLst>
+      <a:effectStyleLst>
+        <a:effectStyle>
+          <a:effectLst/>
+        </a:effectStyle>
+        <a:effectStyle>
+          <a:effectLst/>
+        </a:effectStyle>
+        <a:effectStyle>
+          <a:effectLst>
+            <a:outerShdw blurRad="57150" dist="19050" dir="5400000" algn="ctr" rotWithShape="0">
+              <a:srgbClr val="000000">
+                <a:alpha val="63000"/>
+              </a:srgbClr>
+            </a:outerShdw>
+          </a:effectLst>
+        </a:effectStyle>
+      </a:effectStyleLst>
+      <a:bgFillStyleLst>
+        <a:solidFill>
+          <a:schemeClr val="phClr"/>
+        </a:solidFill>
+        <a:solidFill>
+          <a:schemeClr val="phClr">
+            <a:tint val="95000"/>
+            <a:satMod val="170000"/>
+          </a:schemeClr>
+        </a:solidFill>
+        <a:gradFill rotWithShape="1">
+          <a:gsLst>
+            <a:gs pos="0">
+              <a:schemeClr val="phClr">
+                <a:tint val="93000"/>
+                <a:satMod val="150000"/>
+                <a:shade val="98000"/>
+                <a:lumMod val="102000"/>
+              </a:schemeClr>
+            </a:gs>
+            <a:gs pos="50000">
+              <a:schemeClr val="phClr">
+                <a:tint val="98000"/>
+                <a:satMod val="130000"/>
+                <a:shade val="90000"/>
+                <a:lumMod val="103000"/>
+              </a:schemeClr>
+            </a:gs>
+            <a:gs pos="100000">
+              <a:schemeClr val="phClr">
+                <a:shade val="63000"/>
+                <a:satMod val="120000"/>
+              </a:schemeClr>
+            </a:gs>
+          </a:gsLst>
+          <a:lin ang="5400000" scaled="0"/>
+        </a:gradFill>
+      </a:bgFillStyleLst>
+    </a:fmtScheme>
+  </a:themeElements>
+  <a:objectDefaults/>
+  <a:extraClrSchemeLst/>
+  <a:extLst>
+    <a:ext uri="{05A4C25C-085E-4340-85A3-A5531E510DB2}">
+      <thm15:themeFamily xmlns:thm15="http://schemas.microsoft.com/office/thememl/2012/main" name="Office Theme" id="{62F939B6-93AF-4DB8-9C6B-D6C7DFDC589F}" vid="{4A3C46E8-61CC-4603-A589-7422A47A8E4A}"/>
+    </a:ext>
+  </a:extLst>
+</a:theme>
 </file>
</xml_diff>